<commit_message>
Hero Ozagho Final Project Powerpoint Slides
</commit_message>
<xml_diff>
--- a/Hero Ozagho Final Project Presentation.pptx
+++ b/Hero Ozagho Final Project Presentation.pptx
@@ -279,7 +279,7 @@
           <a:p>
             <a:fld id="{656F1EEE-84BF-47BF-B5EB-E3ED21D02B9D}" type="datetimeFigureOut">
               <a:rPr lang="en-US" smtClean="0"/>
-              <a:t>5/3/2021</a:t>
+              <a:t>5/5/2021</a:t>
             </a:fld>
             <a:endParaRPr lang="en-US"/>
           </a:p>
@@ -477,7 +477,7 @@
           <a:p>
             <a:fld id="{656F1EEE-84BF-47BF-B5EB-E3ED21D02B9D}" type="datetimeFigureOut">
               <a:rPr lang="en-US" smtClean="0"/>
-              <a:t>5/3/2021</a:t>
+              <a:t>5/5/2021</a:t>
             </a:fld>
             <a:endParaRPr lang="en-US"/>
           </a:p>
@@ -685,7 +685,7 @@
           <a:p>
             <a:fld id="{656F1EEE-84BF-47BF-B5EB-E3ED21D02B9D}" type="datetimeFigureOut">
               <a:rPr lang="en-US" smtClean="0"/>
-              <a:t>5/3/2021</a:t>
+              <a:t>5/5/2021</a:t>
             </a:fld>
             <a:endParaRPr lang="en-US"/>
           </a:p>
@@ -883,7 +883,7 @@
           <a:p>
             <a:fld id="{656F1EEE-84BF-47BF-B5EB-E3ED21D02B9D}" type="datetimeFigureOut">
               <a:rPr lang="en-US" smtClean="0"/>
-              <a:t>5/3/2021</a:t>
+              <a:t>5/5/2021</a:t>
             </a:fld>
             <a:endParaRPr lang="en-US"/>
           </a:p>
@@ -1158,7 +1158,7 @@
           <a:p>
             <a:fld id="{656F1EEE-84BF-47BF-B5EB-E3ED21D02B9D}" type="datetimeFigureOut">
               <a:rPr lang="en-US" smtClean="0"/>
-              <a:t>5/3/2021</a:t>
+              <a:t>5/5/2021</a:t>
             </a:fld>
             <a:endParaRPr lang="en-US"/>
           </a:p>
@@ -1423,7 +1423,7 @@
           <a:p>
             <a:fld id="{656F1EEE-84BF-47BF-B5EB-E3ED21D02B9D}" type="datetimeFigureOut">
               <a:rPr lang="en-US" smtClean="0"/>
-              <a:t>5/3/2021</a:t>
+              <a:t>5/5/2021</a:t>
             </a:fld>
             <a:endParaRPr lang="en-US"/>
           </a:p>
@@ -1835,7 +1835,7 @@
           <a:p>
             <a:fld id="{656F1EEE-84BF-47BF-B5EB-E3ED21D02B9D}" type="datetimeFigureOut">
               <a:rPr lang="en-US" smtClean="0"/>
-              <a:t>5/3/2021</a:t>
+              <a:t>5/5/2021</a:t>
             </a:fld>
             <a:endParaRPr lang="en-US"/>
           </a:p>
@@ -1976,7 +1976,7 @@
           <a:p>
             <a:fld id="{656F1EEE-84BF-47BF-B5EB-E3ED21D02B9D}" type="datetimeFigureOut">
               <a:rPr lang="en-US" smtClean="0"/>
-              <a:t>5/3/2021</a:t>
+              <a:t>5/5/2021</a:t>
             </a:fld>
             <a:endParaRPr lang="en-US"/>
           </a:p>
@@ -2089,7 +2089,7 @@
           <a:p>
             <a:fld id="{656F1EEE-84BF-47BF-B5EB-E3ED21D02B9D}" type="datetimeFigureOut">
               <a:rPr lang="en-US" smtClean="0"/>
-              <a:t>5/3/2021</a:t>
+              <a:t>5/5/2021</a:t>
             </a:fld>
             <a:endParaRPr lang="en-US"/>
           </a:p>
@@ -2400,7 +2400,7 @@
           <a:p>
             <a:fld id="{656F1EEE-84BF-47BF-B5EB-E3ED21D02B9D}" type="datetimeFigureOut">
               <a:rPr lang="en-US" smtClean="0"/>
-              <a:t>5/3/2021</a:t>
+              <a:t>5/5/2021</a:t>
             </a:fld>
             <a:endParaRPr lang="en-US"/>
           </a:p>
@@ -2688,7 +2688,7 @@
           <a:p>
             <a:fld id="{656F1EEE-84BF-47BF-B5EB-E3ED21D02B9D}" type="datetimeFigureOut">
               <a:rPr lang="en-US" smtClean="0"/>
-              <a:t>5/3/2021</a:t>
+              <a:t>5/5/2021</a:t>
             </a:fld>
             <a:endParaRPr lang="en-US"/>
           </a:p>
@@ -2929,7 +2929,7 @@
           <a:p>
             <a:fld id="{656F1EEE-84BF-47BF-B5EB-E3ED21D02B9D}" type="datetimeFigureOut">
               <a:rPr lang="en-US" smtClean="0"/>
-              <a:t>5/3/2021</a:t>
+              <a:t>5/5/2021</a:t>
             </a:fld>
             <a:endParaRPr lang="en-US"/>
           </a:p>

</xml_diff>